<commit_message>
Final day 2 files
</commit_message>
<xml_diff>
--- a/day2/lecture2_maximum_likelihood_spa.pptx
+++ b/day2/lecture2_maximum_likelihood_spa.pptx
@@ -228,7 +228,7 @@
           <a:p>
             <a:fld id="{9EC8F33C-A7AA-43A7-BCA9-F081EA0B4664}" type="datetimeFigureOut">
               <a:rPr lang="en-US" smtClean="0"/>
-              <a:t>1/9/2022</a:t>
+              <a:t>1/11/2022</a:t>
             </a:fld>
             <a:endParaRPr lang="en-US"/>
           </a:p>
@@ -661,7 +661,7 @@
           </a:ln>
           <a:extLst>
             <a:ext uri="{909E8E84-426E-40dd-AFC4-6F175D3DCCD1}">
-              <a14:hiddenFill xmlns:a14="http://schemas.microsoft.com/office/drawing/2010/main" xmlns="">
+              <a14:hiddenFill xmlns="" xmlns:a14="http://schemas.microsoft.com/office/drawing/2010/main">
                 <a:solidFill>
                   <a:srgbClr val="FFFFFF"/>
                 </a:solidFill>
@@ -704,7 +704,7 @@
           </a:ln>
           <a:extLst>
             <a:ext uri="{909E8E84-426E-40dd-AFC4-6F175D3DCCD1}">
-              <a14:hiddenFill xmlns:a14="http://schemas.microsoft.com/office/drawing/2010/main" xmlns="">
+              <a14:hiddenFill xmlns="" xmlns:a14="http://schemas.microsoft.com/office/drawing/2010/main">
                 <a:noFill/>
               </a14:hiddenFill>
             </a:ext>
@@ -803,7 +803,7 @@
           <a:p>
             <a:fld id="{9A356AEA-056F-417E-9B38-4BA8743FE6C4}" type="datetime1">
               <a:rPr lang="en-US" smtClean="0"/>
-              <a:t>1/9/2022</a:t>
+              <a:t>1/11/2022</a:t>
             </a:fld>
             <a:endParaRPr lang="en-US"/>
           </a:p>
@@ -990,7 +990,7 @@
           <a:p>
             <a:fld id="{09867F7C-1948-4907-9EBC-DD38682B5188}" type="datetime1">
               <a:rPr lang="en-US" smtClean="0"/>
-              <a:t>1/9/2022</a:t>
+              <a:t>1/11/2022</a:t>
             </a:fld>
             <a:endParaRPr lang="en-US"/>
           </a:p>
@@ -1186,7 +1186,7 @@
           <a:p>
             <a:fld id="{A5996870-3492-4879-A20C-50CF7F25E309}" type="datetime1">
               <a:rPr lang="en-US" smtClean="0"/>
-              <a:t>1/9/2022</a:t>
+              <a:t>1/11/2022</a:t>
             </a:fld>
             <a:endParaRPr lang="en-US"/>
           </a:p>
@@ -1438,7 +1438,7 @@
           <a:p>
             <a:fld id="{3339509F-2835-4D20-8448-C5CCD453FC4A}" type="datetime1">
               <a:rPr lang="en-US" smtClean="0"/>
-              <a:t>1/9/2022</a:t>
+              <a:t>1/11/2022</a:t>
             </a:fld>
             <a:endParaRPr lang="en-US"/>
           </a:p>
@@ -1662,7 +1662,7 @@
           <a:p>
             <a:fld id="{7A6EDDDE-DBE4-4114-B865-EC3A2920782E}" type="datetime1">
               <a:rPr lang="en-US" smtClean="0"/>
-              <a:t>1/9/2022</a:t>
+              <a:t>1/11/2022</a:t>
             </a:fld>
             <a:endParaRPr lang="en-US"/>
           </a:p>
@@ -1970,7 +1970,7 @@
           <a:p>
             <a:fld id="{8DA96907-43AE-4B1E-B5FF-6853ADDA5697}" type="datetime1">
               <a:rPr lang="en-US" smtClean="0"/>
-              <a:t>1/9/2022</a:t>
+              <a:t>1/11/2022</a:t>
             </a:fld>
             <a:endParaRPr lang="en-US"/>
           </a:p>
@@ -2138,7 +2138,7 @@
           <a:p>
             <a:fld id="{2E65DF97-DE0F-4515-8F8D-0E1C627BC4E9}" type="datetime1">
               <a:rPr lang="en-US" smtClean="0"/>
-              <a:t>1/9/2022</a:t>
+              <a:t>1/11/2022</a:t>
             </a:fld>
             <a:endParaRPr lang="en-US"/>
           </a:p>
@@ -2450,7 +2450,7 @@
           <a:p>
             <a:fld id="{23B9FD00-80D5-4EA7-B536-8F4F2C3959C9}" type="datetime1">
               <a:rPr lang="en-US" smtClean="0"/>
-              <a:t>1/9/2022</a:t>
+              <a:t>1/11/2022</a:t>
             </a:fld>
             <a:endParaRPr lang="en-US"/>
           </a:p>
@@ -2762,7 +2762,7 @@
           <a:p>
             <a:fld id="{DAC77084-4DB4-4A23-9870-BF49183ACB4C}" type="datetime1">
               <a:rPr lang="en-US" smtClean="0"/>
-              <a:t>1/9/2022</a:t>
+              <a:t>1/11/2022</a:t>
             </a:fld>
             <a:endParaRPr lang="en-US"/>
           </a:p>
@@ -2948,7 +2948,7 @@
           <a:p>
             <a:fld id="{6E487ECE-0D8C-4AFB-BD35-997F06E0971C}" type="datetime1">
               <a:rPr lang="en-US" smtClean="0"/>
-              <a:t>1/9/2022</a:t>
+              <a:t>1/11/2022</a:t>
             </a:fld>
             <a:endParaRPr lang="en-US"/>
           </a:p>
@@ -3157,7 +3157,7 @@
           <a:p>
             <a:fld id="{D4F6DC8D-78A1-49CC-B033-F77D87B04958}" type="datetime1">
               <a:rPr lang="en-US" smtClean="0"/>
-              <a:t>1/9/2022</a:t>
+              <a:t>1/11/2022</a:t>
             </a:fld>
             <a:endParaRPr lang="en-US"/>
           </a:p>
@@ -3460,7 +3460,7 @@
           <a:p>
             <a:fld id="{3BCF4A7C-A413-48DA-9211-5240CAEE1DD4}" type="datetime1">
               <a:rPr lang="en-US" smtClean="0"/>
-              <a:t>1/9/2022</a:t>
+              <a:t>1/11/2022</a:t>
             </a:fld>
             <a:endParaRPr lang="en-US"/>
           </a:p>
@@ -3902,7 +3902,7 @@
           <a:p>
             <a:fld id="{AAE887C4-8D00-4515-BD6B-6D6B646F02F7}" type="datetime1">
               <a:rPr lang="en-US" smtClean="0"/>
-              <a:t>1/9/2022</a:t>
+              <a:t>1/11/2022</a:t>
             </a:fld>
             <a:endParaRPr lang="en-US"/>
           </a:p>
@@ -4037,7 +4037,7 @@
           <a:p>
             <a:fld id="{10C13C5A-776A-4D2B-A91E-2ACB7D90E7CC}" type="datetime1">
               <a:rPr lang="en-US" smtClean="0"/>
-              <a:t>1/9/2022</a:t>
+              <a:t>1/11/2022</a:t>
             </a:fld>
             <a:endParaRPr lang="en-US"/>
           </a:p>
@@ -4150,7 +4150,7 @@
           <a:p>
             <a:fld id="{00A5D59F-6FC3-492C-BAE3-F50C9D1FBA31}" type="datetime1">
               <a:rPr lang="en-US" smtClean="0"/>
-              <a:t>1/9/2022</a:t>
+              <a:t>1/11/2022</a:t>
             </a:fld>
             <a:endParaRPr lang="en-US"/>
           </a:p>
@@ -4443,7 +4443,7 @@
           <a:p>
             <a:fld id="{CD78B45F-E474-4F2F-801A-58FC9FE22655}" type="datetime1">
               <a:rPr lang="en-US" smtClean="0"/>
-              <a:t>1/9/2022</a:t>
+              <a:t>1/11/2022</a:t>
             </a:fld>
             <a:endParaRPr lang="en-US"/>
           </a:p>
@@ -4717,7 +4717,7 @@
           <a:p>
             <a:fld id="{FDF35450-A835-4587-8F84-782057674F92}" type="datetime1">
               <a:rPr lang="en-US" smtClean="0"/>
-              <a:t>1/9/2022</a:t>
+              <a:t>1/11/2022</a:t>
             </a:fld>
             <a:endParaRPr lang="en-US"/>
           </a:p>
@@ -4839,17 +4839,17 @@
           </a:ln>
           <a:extLst>
             <a:ext uri="{FAA26D3D-D897-4be2-8F04-BA451C77F1D7}">
-              <ma14:placeholderFlag xmlns:ma14="http://schemas.microsoft.com/office/mac/drawingml/2011/main" xmlns="" val="1"/>
+              <ma14:placeholderFlag xmlns="" xmlns:ma14="http://schemas.microsoft.com/office/mac/drawingml/2011/main" val="1"/>
             </a:ext>
             <a:ext uri="{909E8E84-426E-40dd-AFC4-6F175D3DCCD1}">
-              <a14:hiddenFill xmlns:a14="http://schemas.microsoft.com/office/drawing/2010/main" xmlns="">
+              <a14:hiddenFill xmlns="" xmlns:a14="http://schemas.microsoft.com/office/drawing/2010/main">
                 <a:solidFill>
                   <a:srgbClr val="FFFFFF"/>
                 </a:solidFill>
               </a14:hiddenFill>
             </a:ext>
             <a:ext uri="{91240B29-F687-4f45-9708-019B960494DF}">
-              <a14:hiddenLine xmlns:a14="http://schemas.microsoft.com/office/drawing/2010/main" xmlns="" w="9525">
+              <a14:hiddenLine xmlns="" xmlns:a14="http://schemas.microsoft.com/office/drawing/2010/main" w="9525">
                 <a:solidFill>
                   <a:srgbClr val="000000"/>
                 </a:solidFill>
@@ -4901,17 +4901,17 @@
           </a:ln>
           <a:extLst>
             <a:ext uri="{FAA26D3D-D897-4be2-8F04-BA451C77F1D7}">
-              <ma14:placeholderFlag xmlns:ma14="http://schemas.microsoft.com/office/mac/drawingml/2011/main" xmlns="" val="1"/>
+              <ma14:placeholderFlag xmlns="" xmlns:ma14="http://schemas.microsoft.com/office/mac/drawingml/2011/main" val="1"/>
             </a:ext>
             <a:ext uri="{909E8E84-426E-40dd-AFC4-6F175D3DCCD1}">
-              <a14:hiddenFill xmlns:a14="http://schemas.microsoft.com/office/drawing/2010/main" xmlns="">
+              <a14:hiddenFill xmlns="" xmlns:a14="http://schemas.microsoft.com/office/drawing/2010/main">
                 <a:solidFill>
                   <a:srgbClr val="FFFFFF"/>
                 </a:solidFill>
               </a14:hiddenFill>
             </a:ext>
             <a:ext uri="{91240B29-F687-4f45-9708-019B960494DF}">
-              <a14:hiddenLine xmlns:a14="http://schemas.microsoft.com/office/drawing/2010/main" xmlns="" w="9525">
+              <a14:hiddenLine xmlns="" xmlns:a14="http://schemas.microsoft.com/office/drawing/2010/main" w="9525">
                 <a:solidFill>
                   <a:srgbClr val="000000"/>
                 </a:solidFill>
@@ -5011,7 +5011,7 @@
           <a:p>
             <a:fld id="{F6803E09-2A09-4EEA-8E99-292225B5EDFC}" type="datetime1">
               <a:rPr lang="en-US" smtClean="0"/>
-              <a:t>1/9/2022</a:t>
+              <a:t>1/11/2022</a:t>
             </a:fld>
             <a:endParaRPr lang="en-US"/>
           </a:p>
@@ -5179,7 +5179,7 @@
           </a:ln>
           <a:extLst>
             <a:ext uri="{909E8E84-426E-40dd-AFC4-6F175D3DCCD1}">
-              <a14:hiddenFill xmlns:a14="http://schemas.microsoft.com/office/drawing/2010/main" xmlns="">
+              <a14:hiddenFill xmlns="" xmlns:a14="http://schemas.microsoft.com/office/drawing/2010/main">
                 <a:solidFill>
                   <a:srgbClr val="FFFFFF"/>
                 </a:solidFill>
@@ -5222,7 +5222,7 @@
           </a:ln>
           <a:extLst>
             <a:ext uri="{909E8E84-426E-40dd-AFC4-6F175D3DCCD1}">
-              <a14:hiddenFill xmlns:a14="http://schemas.microsoft.com/office/drawing/2010/main" xmlns="">
+              <a14:hiddenFill xmlns="" xmlns:a14="http://schemas.microsoft.com/office/drawing/2010/main">
                 <a:noFill/>
               </a14:hiddenFill>
             </a:ext>
@@ -5718,16 +5718,12 @@
           <a:lstStyle/>
           <a:p>
             <a:r>
-              <a:rPr lang="en-US" dirty="0" err="1"/>
-              <a:t>Optimizaci</a:t>
-            </a:r>
-            <a:r>
-              <a:rPr lang="es-CL" dirty="0" err="1"/>
-              <a:t>ón</a:t>
+              <a:rPr lang="en-US" dirty="0" smtClean="0"/>
+              <a:t>Maximum likelihood</a:t>
             </a:r>
             <a:r>
               <a:rPr lang="es-CL" dirty="0"/>
-              <a:t> numérica</a:t>
+              <a:t/>
             </a:r>
             <a:br>
               <a:rPr lang="es-CL" dirty="0"/>
@@ -5769,17 +5765,17 @@
           </a:ln>
           <a:extLst>
             <a:ext uri="{FAA26D3D-D897-4be2-8F04-BA451C77F1D7}">
-              <ma14:placeholderFlag xmlns:ma14="http://schemas.microsoft.com/office/mac/drawingml/2011/main" xmlns="" val="1"/>
+              <ma14:placeholderFlag xmlns="" xmlns:ma14="http://schemas.microsoft.com/office/mac/drawingml/2011/main" val="1"/>
             </a:ext>
             <a:ext uri="{909E8E84-426E-40dd-AFC4-6F175D3DCCD1}">
-              <a14:hiddenFill xmlns:a14="http://schemas.microsoft.com/office/drawing/2010/main" xmlns="">
+              <a14:hiddenFill xmlns="" xmlns:a14="http://schemas.microsoft.com/office/drawing/2010/main">
                 <a:solidFill>
                   <a:srgbClr val="FFFFFF"/>
                 </a:solidFill>
               </a14:hiddenFill>
             </a:ext>
             <a:ext uri="{91240B29-F687-4f45-9708-019B960494DF}">
-              <a14:hiddenLine xmlns:a14="http://schemas.microsoft.com/office/drawing/2010/main" xmlns="" w="9525">
+              <a14:hiddenLine xmlns="" xmlns:a14="http://schemas.microsoft.com/office/drawing/2010/main" w="9525">
                 <a:solidFill>
                   <a:srgbClr val="000000"/>
                 </a:solidFill>
@@ -6135,7 +6131,7 @@
         </p:nvSpPr>
         <p:spPr>
           <a:xfrm>
-            <a:off x="457200" y="917350"/>
+            <a:off x="614516" y="1298350"/>
             <a:ext cx="8529484" cy="4713287"/>
           </a:xfrm>
         </p:spPr>
@@ -6144,211 +6140,211 @@
           <a:lstStyle/>
           <a:p>
             <a:r>
-              <a:rPr lang="en-US" sz="2800" dirty="0"/>
+              <a:rPr lang="en-US" sz="2400" dirty="0"/>
               <a:t>Revise la </a:t>
             </a:r>
             <a:r>
-              <a:rPr lang="en-US" sz="2800" dirty="0" err="1">
+              <a:rPr lang="en-US" sz="2400" dirty="0" err="1">
                 <a:hlinkClick r:id="rId2"/>
               </a:rPr>
               <a:t>función</a:t>
             </a:r>
             <a:r>
-              <a:rPr lang="en-US" sz="2800" dirty="0">
+              <a:rPr lang="en-US" sz="2400" dirty="0">
                 <a:hlinkClick r:id="rId2"/>
               </a:rPr>
               <a:t> de masa de </a:t>
             </a:r>
             <a:r>
-              <a:rPr lang="en-US" sz="2800" dirty="0" err="1">
+              <a:rPr lang="en-US" sz="2400" dirty="0" err="1">
                 <a:hlinkClick r:id="rId2"/>
               </a:rPr>
               <a:t>probabilidad</a:t>
             </a:r>
             <a:r>
-              <a:rPr lang="en-US" sz="2800" dirty="0">
+              <a:rPr lang="en-US" sz="2400" dirty="0">
                 <a:hlinkClick r:id="rId2"/>
               </a:rPr>
               <a:t> Poisson </a:t>
             </a:r>
             <a:r>
-              <a:rPr lang="en-US" sz="2800" dirty="0"/>
+              <a:rPr lang="en-US" sz="2400" dirty="0"/>
               <a:t>(</a:t>
             </a:r>
             <a:r>
-              <a:rPr lang="en-US" sz="2800" dirty="0" err="1"/>
+              <a:rPr lang="en-US" sz="2400" dirty="0" err="1"/>
               <a:t>pmf</a:t>
             </a:r>
             <a:r>
-              <a:rPr lang="en-US" sz="2800" dirty="0"/>
+              <a:rPr lang="en-US" sz="2400" dirty="0"/>
               <a:t>)</a:t>
             </a:r>
           </a:p>
           <a:p>
             <a:r>
-              <a:rPr lang="en-US" sz="2800" dirty="0" err="1"/>
+              <a:rPr lang="en-US" sz="2400" dirty="0" err="1"/>
               <a:t>Identifique</a:t>
             </a:r>
             <a:r>
-              <a:rPr lang="en-US" sz="2800" dirty="0"/>
+              <a:rPr lang="en-US" sz="2400" dirty="0"/>
               <a:t> que </a:t>
             </a:r>
             <a:r>
-              <a:rPr lang="en-US" sz="2800" dirty="0" err="1"/>
+              <a:rPr lang="en-US" sz="2400" dirty="0" err="1"/>
               <a:t>término</a:t>
             </a:r>
             <a:r>
-              <a:rPr lang="en-US" sz="2800" dirty="0"/>
+              <a:rPr lang="en-US" sz="2400" dirty="0"/>
               <a:t> son </a:t>
             </a:r>
             <a:r>
-              <a:rPr lang="en-US" sz="2800" dirty="0" err="1"/>
+              <a:rPr lang="en-US" sz="2400" dirty="0" err="1"/>
               <a:t>datos</a:t>
             </a:r>
             <a:r>
-              <a:rPr lang="en-US" sz="2800" dirty="0"/>
+              <a:rPr lang="en-US" sz="2400" dirty="0"/>
               <a:t> y </a:t>
             </a:r>
             <a:r>
-              <a:rPr lang="en-US" sz="2800" dirty="0" err="1"/>
+              <a:rPr lang="en-US" sz="2400" dirty="0" err="1"/>
               <a:t>cuales</a:t>
             </a:r>
             <a:r>
-              <a:rPr lang="en-US" sz="2800" dirty="0"/>
+              <a:rPr lang="en-US" sz="2400" dirty="0"/>
               <a:t> son </a:t>
             </a:r>
             <a:r>
-              <a:rPr lang="en-US" sz="2800" dirty="0" err="1"/>
+              <a:rPr lang="en-US" sz="2400" dirty="0" err="1"/>
               <a:t>parámetros</a:t>
             </a:r>
-            <a:endParaRPr lang="en-US" sz="2800" dirty="0"/>
-          </a:p>
-          <a:p>
-            <a:r>
-              <a:rPr lang="en-US" sz="2800" dirty="0" err="1"/>
+            <a:endParaRPr lang="en-US" sz="2400" dirty="0"/>
+          </a:p>
+          <a:p>
+            <a:r>
+              <a:rPr lang="en-US" sz="2400" dirty="0" err="1"/>
               <a:t>Calcule</a:t>
             </a:r>
             <a:r>
-              <a:rPr lang="en-US" sz="2800" dirty="0"/>
+              <a:rPr lang="en-US" sz="2400" dirty="0"/>
               <a:t> </a:t>
             </a:r>
             <a:r>
-              <a:rPr lang="en-US" sz="2800" dirty="0" err="1"/>
+              <a:rPr lang="en-US" sz="2400" dirty="0" err="1"/>
               <a:t>logaritmo</a:t>
             </a:r>
             <a:r>
-              <a:rPr lang="en-US" sz="2800" dirty="0"/>
+              <a:rPr lang="en-US" sz="2400" dirty="0"/>
               <a:t> a mano y </a:t>
             </a:r>
             <a:r>
-              <a:rPr lang="en-US" sz="2800" dirty="0" err="1"/>
+              <a:rPr lang="en-US" sz="2400" dirty="0" err="1"/>
               <a:t>escriba</a:t>
             </a:r>
             <a:r>
-              <a:rPr lang="en-US" sz="2800" dirty="0"/>
+              <a:rPr lang="en-US" sz="2400" dirty="0"/>
               <a:t> la </a:t>
             </a:r>
             <a:r>
-              <a:rPr lang="en-US" sz="2800" dirty="0" err="1"/>
+              <a:rPr lang="en-US" sz="2400" dirty="0" err="1"/>
               <a:t>función</a:t>
             </a:r>
             <a:r>
-              <a:rPr lang="en-US" sz="2800" dirty="0"/>
+              <a:rPr lang="en-US" sz="2400" dirty="0"/>
               <a:t> </a:t>
             </a:r>
             <a:r>
-              <a:rPr lang="en-US" sz="2800" dirty="0" err="1"/>
+              <a:rPr lang="en-US" sz="2400" dirty="0" err="1"/>
               <a:t>en</a:t>
             </a:r>
             <a:r>
-              <a:rPr lang="en-US" sz="2800" dirty="0"/>
+              <a:rPr lang="en-US" sz="2400" dirty="0"/>
               <a:t> R para </a:t>
             </a:r>
             <a:r>
-              <a:rPr lang="en-US" sz="2800" dirty="0" err="1"/>
+              <a:rPr lang="en-US" sz="2400" dirty="0" err="1"/>
               <a:t>calcular</a:t>
             </a:r>
             <a:r>
-              <a:rPr lang="en-US" sz="2800" dirty="0"/>
+              <a:rPr lang="en-US" sz="2400" dirty="0"/>
               <a:t> -log-</a:t>
             </a:r>
             <a:r>
-              <a:rPr lang="en-US" sz="2800" dirty="0" err="1"/>
+              <a:rPr lang="en-US" sz="2400" dirty="0" err="1"/>
               <a:t>verosimilitud</a:t>
             </a:r>
             <a:r>
-              <a:rPr lang="en-US" sz="2800" dirty="0"/>
+              <a:rPr lang="en-US" sz="2400" dirty="0"/>
               <a:t> para un solo punto</a:t>
             </a:r>
           </a:p>
           <a:p>
             <a:r>
-              <a:rPr lang="en-US" sz="2800" dirty="0"/>
+              <a:rPr lang="en-US" sz="2400" dirty="0"/>
               <a:t>[</a:t>
             </a:r>
             <a:r>
-              <a:rPr lang="en-US" sz="2800" dirty="0" err="1"/>
+              <a:rPr lang="en-US" sz="2400" dirty="0" err="1"/>
               <a:t>Ayuda</a:t>
             </a:r>
             <a:r>
-              <a:rPr lang="en-US" sz="2800" dirty="0"/>
+              <a:rPr lang="en-US" sz="2400" dirty="0"/>
               <a:t>: k!=</a:t>
             </a:r>
             <a:r>
-              <a:rPr lang="en-US" sz="2800" dirty="0">
+              <a:rPr lang="en-US" sz="2400" dirty="0">
                 <a:latin typeface="Courier New" panose="02070309020205020404" pitchFamily="49" charset="0"/>
                 <a:cs typeface="Courier New" panose="02070309020205020404" pitchFamily="49" charset="0"/>
               </a:rPr>
               <a:t>factorial(k)</a:t>
             </a:r>
             <a:r>
-              <a:rPr lang="en-US" sz="2800" dirty="0"/>
+              <a:rPr lang="en-US" sz="2400" dirty="0"/>
               <a:t>]</a:t>
             </a:r>
           </a:p>
           <a:p>
             <a:r>
-              <a:rPr lang="en-US" sz="2800" dirty="0" err="1"/>
+              <a:rPr lang="en-US" sz="2400" dirty="0" err="1"/>
               <a:t>Evalúe</a:t>
             </a:r>
             <a:r>
-              <a:rPr lang="en-US" sz="2800" dirty="0"/>
+              <a:rPr lang="en-US" sz="2400" dirty="0"/>
               <a:t> para k=4 y lambda=5.5</a:t>
             </a:r>
           </a:p>
           <a:p>
             <a:r>
-              <a:rPr lang="en-US" sz="2800" dirty="0" err="1"/>
+              <a:rPr lang="en-US" sz="2400" dirty="0" err="1"/>
               <a:t>Verifique</a:t>
             </a:r>
             <a:r>
-              <a:rPr lang="en-US" sz="2800" dirty="0"/>
+              <a:rPr lang="en-US" sz="2400" dirty="0"/>
               <a:t> la </a:t>
             </a:r>
             <a:r>
-              <a:rPr lang="en-US" sz="2800" dirty="0" err="1"/>
+              <a:rPr lang="en-US" sz="2400" dirty="0" err="1"/>
               <a:t>respuesta</a:t>
             </a:r>
             <a:r>
-              <a:rPr lang="en-US" sz="2800" dirty="0"/>
+              <a:rPr lang="en-US" sz="2400" dirty="0"/>
               <a:t> con </a:t>
             </a:r>
             <a:r>
-              <a:rPr lang="en-US" sz="2000" dirty="0">
+              <a:rPr lang="en-US" sz="1800" dirty="0">
                 <a:latin typeface="Courier New" panose="02070309020205020404" pitchFamily="49" charset="0"/>
                 <a:cs typeface="Courier New" panose="02070309020205020404" pitchFamily="49" charset="0"/>
               </a:rPr>
               <a:t>-</a:t>
             </a:r>
             <a:r>
-              <a:rPr lang="en-US" sz="2000" dirty="0" err="1">
+              <a:rPr lang="en-US" sz="1800" dirty="0" err="1">
                 <a:latin typeface="Courier New" panose="02070309020205020404" pitchFamily="49" charset="0"/>
                 <a:cs typeface="Courier New" panose="02070309020205020404" pitchFamily="49" charset="0"/>
               </a:rPr>
               <a:t>dpois</a:t>
             </a:r>
             <a:r>
-              <a:rPr lang="en-US" sz="2000" dirty="0">
+              <a:rPr lang="en-US" sz="1800" dirty="0">
                 <a:latin typeface="Courier New" panose="02070309020205020404" pitchFamily="49" charset="0"/>
                 <a:cs typeface="Courier New" panose="02070309020205020404" pitchFamily="49" charset="0"/>
               </a:rPr>
@@ -6357,53 +6353,53 @@
           </a:p>
           <a:p>
             <a:r>
-              <a:rPr lang="en-US" sz="2800" dirty="0" err="1"/>
+              <a:rPr lang="en-US" sz="2400" dirty="0" err="1"/>
               <a:t>Grafique</a:t>
             </a:r>
             <a:r>
-              <a:rPr lang="en-US" sz="2800" dirty="0"/>
+              <a:rPr lang="en-US" sz="2400" dirty="0"/>
               <a:t> NLL para lambda entre 0 y 15</a:t>
             </a:r>
           </a:p>
           <a:p>
             <a:r>
-              <a:rPr lang="en-US" sz="2800" dirty="0" err="1"/>
+              <a:rPr lang="en-US" sz="2400" dirty="0" err="1"/>
               <a:t>Cuál</a:t>
             </a:r>
             <a:r>
-              <a:rPr lang="en-US" sz="2800" dirty="0"/>
+              <a:rPr lang="en-US" sz="2400" dirty="0"/>
               <a:t> es </a:t>
             </a:r>
             <a:r>
-              <a:rPr lang="en-US" sz="2800" dirty="0" err="1"/>
+              <a:rPr lang="en-US" sz="2400" dirty="0" err="1"/>
               <a:t>el</a:t>
             </a:r>
             <a:r>
-              <a:rPr lang="en-US" sz="2800" dirty="0"/>
+              <a:rPr lang="en-US" sz="2400" dirty="0"/>
               <a:t> </a:t>
             </a:r>
             <a:r>
-              <a:rPr lang="en-US" sz="2800" dirty="0" err="1"/>
+              <a:rPr lang="en-US" sz="2400" dirty="0" err="1"/>
               <a:t>mínimo</a:t>
             </a:r>
             <a:r>
-              <a:rPr lang="en-US" sz="2800" dirty="0"/>
+              <a:rPr lang="en-US" sz="2400" dirty="0"/>
               <a:t> de </a:t>
             </a:r>
             <a:r>
-              <a:rPr lang="en-US" sz="2800" dirty="0" err="1"/>
+              <a:rPr lang="en-US" sz="2400" dirty="0" err="1"/>
               <a:t>esta</a:t>
             </a:r>
             <a:r>
-              <a:rPr lang="en-US" sz="2800" dirty="0"/>
+              <a:rPr lang="en-US" sz="2400" dirty="0"/>
               <a:t> </a:t>
             </a:r>
             <a:r>
-              <a:rPr lang="en-US" sz="2800" dirty="0" err="1"/>
+              <a:rPr lang="en-US" sz="2400" dirty="0" err="1"/>
               <a:t>función</a:t>
             </a:r>
             <a:r>
-              <a:rPr lang="en-US" sz="2800" dirty="0"/>
+              <a:rPr lang="en-US" sz="2400" dirty="0"/>
               <a:t>?</a:t>
             </a:r>
           </a:p>
@@ -6727,10 +6723,30 @@
             </a:r>
             <a:r>
               <a:rPr lang="en-US" dirty="0"/>
-              <a:t> usar exp(</a:t>
-            </a:r>
-            <a:r>
-              <a:rPr lang="en-US" dirty="0" err="1"/>
+              <a:t> </a:t>
+            </a:r>
+            <a:r>
+              <a:rPr lang="en-US" dirty="0" err="1"/>
+              <a:t>usar</a:t>
+            </a:r>
+            <a:r>
+              <a:rPr lang="en-US" dirty="0"/>
+              <a:t> </a:t>
+            </a:r>
+            <a:r>
+              <a:rPr lang="en-US" dirty="0" smtClean="0"/>
+              <a:t>sigma=</a:t>
+            </a:r>
+            <a:r>
+              <a:rPr lang="en-US" dirty="0" err="1" smtClean="0"/>
+              <a:t>exp</a:t>
+            </a:r>
+            <a:r>
+              <a:rPr lang="en-US" dirty="0" smtClean="0"/>
+              <a:t>(</a:t>
+            </a:r>
+            <a:r>
+              <a:rPr lang="en-US" dirty="0" err="1" smtClean="0"/>
               <a:t>logsigma</a:t>
             </a:r>
             <a:r>
@@ -8033,17 +8049,17 @@
           </a:ln>
           <a:extLst>
             <a:ext uri="{FAA26D3D-D897-4be2-8F04-BA451C77F1D7}">
-              <ma14:placeholderFlag xmlns:ma14="http://schemas.microsoft.com/office/mac/drawingml/2011/main" xmlns="" val="1"/>
+              <ma14:placeholderFlag xmlns="" xmlns:ma14="http://schemas.microsoft.com/office/mac/drawingml/2011/main" val="1"/>
             </a:ext>
             <a:ext uri="{909E8E84-426E-40dd-AFC4-6F175D3DCCD1}">
-              <a14:hiddenFill xmlns:a14="http://schemas.microsoft.com/office/drawing/2010/main" xmlns="">
+              <a14:hiddenFill xmlns="" xmlns:a14="http://schemas.microsoft.com/office/drawing/2010/main">
                 <a:solidFill>
                   <a:srgbClr val="FFFFFF"/>
                 </a:solidFill>
               </a14:hiddenFill>
             </a:ext>
             <a:ext uri="{91240B29-F687-4f45-9708-019B960494DF}">
-              <a14:hiddenLine xmlns:a14="http://schemas.microsoft.com/office/drawing/2010/main" xmlns="" w="9525">
+              <a14:hiddenLine xmlns="" xmlns:a14="http://schemas.microsoft.com/office/drawing/2010/main" w="9525">
                 <a:solidFill>
                   <a:srgbClr val="000000"/>
                 </a:solidFill>
@@ -8279,16 +8295,10 @@
               <a:t> una </a:t>
             </a:r>
             <a:r>
-              <a:rPr lang="en-US" kern="0" dirty="0" err="1">
-                <a:hlinkClick r:id="rId4"/>
-              </a:rPr>
-              <a:t>solución</a:t>
-            </a:r>
-            <a:r>
               <a:rPr lang="en-US" kern="0" dirty="0">
                 <a:hlinkClick r:id="rId4"/>
               </a:rPr>
-              <a:t> </a:t>
+              <a:t>solución </a:t>
             </a:r>
             <a:r>
               <a:rPr lang="en-US" kern="0" dirty="0" err="1">
@@ -8740,8 +8750,19 @@
                 <a:latin typeface="Courier New" panose="02070309020205020404" pitchFamily="49" charset="0"/>
                 <a:cs typeface="Courier New" panose="02070309020205020404" pitchFamily="49" charset="0"/>
               </a:rPr>
-              <a:t>, log=T))</a:t>
-            </a:r>
+              <a:t>, </a:t>
+            </a:r>
+            <a:r>
+              <a:rPr lang="en-US" sz="2000" dirty="0" smtClean="0">
+                <a:latin typeface="Courier New" panose="02070309020205020404" pitchFamily="49" charset="0"/>
+                <a:cs typeface="Courier New" panose="02070309020205020404" pitchFamily="49" charset="0"/>
+              </a:rPr>
+              <a:t>log=T))</a:t>
+            </a:r>
+            <a:endParaRPr lang="en-US" sz="2000" dirty="0">
+              <a:latin typeface="Courier New" panose="02070309020205020404" pitchFamily="49" charset="0"/>
+              <a:cs typeface="Courier New" panose="02070309020205020404" pitchFamily="49" charset="0"/>
+            </a:endParaRPr>
           </a:p>
           <a:p>
             <a:r>
@@ -11775,7 +11796,7 @@
         </p:nvSpPr>
         <p:spPr>
           <a:xfrm>
-            <a:off x="510294" y="1417639"/>
+            <a:off x="510294" y="1138239"/>
             <a:ext cx="8176505" cy="4384576"/>
           </a:xfrm>
         </p:spPr>
@@ -11784,249 +11805,249 @@
           <a:lstStyle/>
           <a:p>
             <a:r>
-              <a:rPr lang="en-US" dirty="0"/>
+              <a:rPr lang="en-US" sz="2800" dirty="0"/>
               <a:t>Dado los </a:t>
             </a:r>
             <a:r>
-              <a:rPr lang="en-US" dirty="0" err="1"/>
+              <a:rPr lang="en-US" sz="2800" dirty="0" err="1"/>
               <a:t>datos</a:t>
             </a:r>
             <a:r>
-              <a:rPr lang="en-US" dirty="0"/>
+              <a:rPr lang="en-US" sz="2800" dirty="0"/>
               <a:t> y a model expectation, se </a:t>
             </a:r>
             <a:r>
-              <a:rPr lang="en-US" dirty="0" err="1"/>
+              <a:rPr lang="en-US" sz="2800" dirty="0" err="1"/>
               <a:t>pueden</a:t>
             </a:r>
             <a:r>
-              <a:rPr lang="en-US" dirty="0"/>
+              <a:rPr lang="en-US" sz="2800" dirty="0"/>
               <a:t> </a:t>
             </a:r>
             <a:r>
-              <a:rPr lang="en-US" dirty="0" err="1"/>
+              <a:rPr lang="en-US" sz="2800" dirty="0" err="1"/>
               <a:t>calcular</a:t>
             </a:r>
             <a:r>
-              <a:rPr lang="en-US" dirty="0"/>
+              <a:rPr lang="en-US" sz="2800" dirty="0"/>
               <a:t> las </a:t>
             </a:r>
             <a:r>
-              <a:rPr lang="en-US"/>
+              <a:rPr lang="en-US" sz="2800" dirty="0" err="1"/>
               <a:t>verosimilitudes</a:t>
             </a:r>
-            <a:endParaRPr lang="en-US" dirty="0"/>
-          </a:p>
-          <a:p>
-            <a:r>
-              <a:rPr lang="en-US" dirty="0"/>
+            <a:endParaRPr lang="en-US" sz="2800" dirty="0"/>
+          </a:p>
+          <a:p>
+            <a:r>
+              <a:rPr lang="en-US" sz="2800" dirty="0"/>
               <a:t>Para “</a:t>
             </a:r>
             <a:r>
-              <a:rPr lang="en-US" dirty="0" err="1"/>
+              <a:rPr lang="en-US" sz="2800" dirty="0" err="1"/>
               <a:t>ajustar</a:t>
             </a:r>
             <a:r>
-              <a:rPr lang="en-US" dirty="0"/>
+              <a:rPr lang="en-US" sz="2800" dirty="0"/>
               <a:t>” </a:t>
             </a:r>
             <a:r>
-              <a:rPr lang="en-US" dirty="0" err="1"/>
+              <a:rPr lang="en-US" sz="2800" dirty="0" err="1"/>
               <a:t>modelos</a:t>
             </a:r>
             <a:r>
-              <a:rPr lang="en-US" dirty="0"/>
+              <a:rPr lang="en-US" sz="2800" dirty="0"/>
               <a:t> </a:t>
             </a:r>
             <a:r>
-              <a:rPr lang="en-US" dirty="0" err="1"/>
+              <a:rPr lang="en-US" sz="2800" dirty="0" err="1"/>
               <a:t>estadísticos</a:t>
             </a:r>
             <a:r>
-              <a:rPr lang="en-US" dirty="0"/>
+              <a:rPr lang="en-US" sz="2800" dirty="0"/>
               <a:t> </a:t>
             </a:r>
             <a:r>
-              <a:rPr lang="en-US" dirty="0" err="1"/>
+              <a:rPr lang="en-US" sz="2800" dirty="0" err="1"/>
               <a:t>nosotros</a:t>
             </a:r>
             <a:r>
-              <a:rPr lang="en-US" dirty="0"/>
+              <a:rPr lang="en-US" sz="2800" dirty="0"/>
               <a:t> </a:t>
             </a:r>
             <a:r>
-              <a:rPr lang="en-US" dirty="0" err="1"/>
+              <a:rPr lang="en-US" sz="2800" dirty="0" err="1"/>
               <a:t>optimizamos</a:t>
             </a:r>
             <a:r>
-              <a:rPr lang="en-US" dirty="0"/>
+              <a:rPr lang="en-US" sz="2800" dirty="0"/>
               <a:t> </a:t>
             </a:r>
             <a:r>
-              <a:rPr lang="en-US" dirty="0" err="1"/>
+              <a:rPr lang="en-US" sz="2800" dirty="0" err="1"/>
               <a:t>numericamente</a:t>
             </a:r>
             <a:r>
-              <a:rPr lang="en-US" dirty="0"/>
+              <a:rPr lang="en-US" sz="2800" dirty="0"/>
               <a:t> –log-</a:t>
             </a:r>
             <a:r>
-              <a:rPr lang="en-US" dirty="0" err="1"/>
+              <a:rPr lang="en-US" sz="2800" dirty="0" err="1"/>
               <a:t>verosimilitud</a:t>
             </a:r>
             <a:r>
-              <a:rPr lang="en-US" dirty="0"/>
+              <a:rPr lang="en-US" sz="2800" dirty="0"/>
               <a:t> para </a:t>
             </a:r>
             <a:r>
-              <a:rPr lang="en-US" dirty="0" err="1"/>
+              <a:rPr lang="en-US" sz="2800" dirty="0" err="1"/>
               <a:t>encontrar</a:t>
             </a:r>
             <a:r>
-              <a:rPr lang="en-US" dirty="0"/>
+              <a:rPr lang="en-US" sz="2800" dirty="0"/>
               <a:t> </a:t>
             </a:r>
             <a:r>
-              <a:rPr lang="en-US" dirty="0" err="1"/>
+              <a:rPr lang="en-US" sz="2800" dirty="0" err="1"/>
               <a:t>el</a:t>
             </a:r>
             <a:r>
-              <a:rPr lang="en-US" dirty="0"/>
+              <a:rPr lang="en-US" sz="2800" dirty="0"/>
               <a:t> MLE</a:t>
             </a:r>
           </a:p>
           <a:p>
             <a:pPr lvl="1"/>
             <a:r>
-              <a:rPr lang="en-US" dirty="0"/>
+              <a:rPr lang="en-US" sz="2400" dirty="0"/>
               <a:t>Lo </a:t>
             </a:r>
             <a:r>
-              <a:rPr lang="en-US" dirty="0" err="1"/>
+              <a:rPr lang="en-US" sz="2400" dirty="0" err="1"/>
               <a:t>mismo</a:t>
             </a:r>
             <a:r>
-              <a:rPr lang="en-US" dirty="0"/>
+              <a:rPr lang="en-US" sz="2400" dirty="0"/>
               <a:t> que </a:t>
             </a:r>
             <a:r>
-              <a:rPr lang="en-US" dirty="0" err="1"/>
+              <a:rPr lang="en-US" sz="2400" dirty="0" err="1"/>
               <a:t>maximizar</a:t>
             </a:r>
             <a:r>
-              <a:rPr lang="en-US" dirty="0"/>
+              <a:rPr lang="en-US" sz="2400" dirty="0"/>
               <a:t> la </a:t>
             </a:r>
             <a:r>
-              <a:rPr lang="en-US" dirty="0" err="1"/>
+              <a:rPr lang="en-US" sz="2400" dirty="0" err="1"/>
               <a:t>verosimilitud</a:t>
             </a:r>
-            <a:endParaRPr lang="en-US" dirty="0"/>
-          </a:p>
-          <a:p>
-            <a:r>
-              <a:rPr lang="en-US" dirty="0" err="1"/>
+            <a:endParaRPr lang="en-US" sz="2400" dirty="0"/>
+          </a:p>
+          <a:p>
+            <a:r>
+              <a:rPr lang="en-US" sz="2800" dirty="0" err="1"/>
               <a:t>Optimización</a:t>
             </a:r>
             <a:r>
-              <a:rPr lang="en-US" dirty="0"/>
+              <a:rPr lang="en-US" sz="2800" dirty="0"/>
               <a:t> es major </a:t>
             </a:r>
             <a:r>
-              <a:rPr lang="en-US" dirty="0" err="1"/>
+              <a:rPr lang="en-US" sz="2800" dirty="0" err="1"/>
               <a:t>cuando</a:t>
             </a:r>
             <a:r>
-              <a:rPr lang="en-US" dirty="0"/>
+              <a:rPr lang="en-US" sz="2800" dirty="0"/>
               <a:t> se </a:t>
             </a:r>
             <a:r>
-              <a:rPr lang="en-US" dirty="0" err="1"/>
+              <a:rPr lang="en-US" sz="2800" dirty="0" err="1"/>
               <a:t>tiene</a:t>
             </a:r>
             <a:r>
-              <a:rPr lang="en-US" dirty="0"/>
+              <a:rPr lang="en-US" sz="2800" dirty="0"/>
               <a:t> </a:t>
             </a:r>
             <a:r>
-              <a:rPr lang="en-US" dirty="0" err="1"/>
+              <a:rPr lang="en-US" sz="2800" dirty="0" err="1"/>
               <a:t>gradientes</a:t>
             </a:r>
             <a:r>
-              <a:rPr lang="en-US" dirty="0"/>
+              <a:rPr lang="en-US" sz="2800" dirty="0"/>
               <a:t>, y TMB los </a:t>
             </a:r>
             <a:r>
-              <a:rPr lang="en-US" dirty="0" err="1"/>
+              <a:rPr lang="en-US" sz="2800" dirty="0" err="1"/>
               <a:t>calcula</a:t>
             </a:r>
             <a:r>
-              <a:rPr lang="en-US" dirty="0"/>
+              <a:rPr lang="en-US" sz="2800" dirty="0"/>
               <a:t> con </a:t>
             </a:r>
             <a:r>
-              <a:rPr lang="en-US" dirty="0" err="1"/>
+              <a:rPr lang="en-US" sz="2800" dirty="0" err="1"/>
               <a:t>facilidad</a:t>
             </a:r>
-            <a:endParaRPr lang="en-US" dirty="0"/>
-          </a:p>
-          <a:p>
-            <a:r>
-              <a:rPr lang="en-US" dirty="0" err="1"/>
+            <a:endParaRPr lang="en-US" sz="2800" dirty="0"/>
+          </a:p>
+          <a:p>
+            <a:r>
+              <a:rPr lang="en-US" sz="2800" dirty="0" err="1"/>
               <a:t>Usamos</a:t>
             </a:r>
             <a:r>
-              <a:rPr lang="en-US" dirty="0"/>
+              <a:rPr lang="en-US" sz="2800" dirty="0"/>
               <a:t> exp() para </a:t>
             </a:r>
             <a:r>
-              <a:rPr lang="en-US" dirty="0" err="1"/>
+              <a:rPr lang="en-US" sz="2800" dirty="0" err="1"/>
               <a:t>mantener</a:t>
             </a:r>
             <a:r>
-              <a:rPr lang="en-US" dirty="0"/>
+              <a:rPr lang="en-US" sz="2800" dirty="0"/>
               <a:t> los </a:t>
             </a:r>
             <a:r>
-              <a:rPr lang="en-US" dirty="0" err="1"/>
+              <a:rPr lang="en-US" sz="2800" dirty="0" err="1"/>
               <a:t>parámetros</a:t>
             </a:r>
             <a:r>
-              <a:rPr lang="en-US" dirty="0"/>
+              <a:rPr lang="en-US" sz="2800" dirty="0"/>
               <a:t> </a:t>
             </a:r>
             <a:r>
-              <a:rPr lang="en-US" dirty="0" err="1"/>
+              <a:rPr lang="en-US" sz="2800" dirty="0" err="1"/>
               <a:t>positivos</a:t>
             </a:r>
-            <a:endParaRPr lang="en-US" dirty="0"/>
-          </a:p>
-          <a:p>
-            <a:r>
-              <a:rPr lang="en-US" dirty="0"/>
+            <a:endParaRPr lang="en-US" sz="2800" dirty="0"/>
+          </a:p>
+          <a:p>
+            <a:r>
+              <a:rPr lang="en-US" sz="2800" dirty="0"/>
               <a:t>La </a:t>
             </a:r>
             <a:r>
-              <a:rPr lang="en-US" dirty="0" err="1"/>
+              <a:rPr lang="en-US" sz="2800" dirty="0" err="1"/>
               <a:t>varianza</a:t>
             </a:r>
             <a:r>
-              <a:rPr lang="en-US" dirty="0"/>
+              <a:rPr lang="en-US" sz="2800" dirty="0"/>
               <a:t> del MLE </a:t>
             </a:r>
             <a:r>
-              <a:rPr lang="en-US" dirty="0" err="1"/>
+              <a:rPr lang="en-US" sz="2800" dirty="0" err="1"/>
               <a:t>está</a:t>
             </a:r>
             <a:r>
-              <a:rPr lang="en-US" dirty="0"/>
+              <a:rPr lang="en-US" sz="2800" dirty="0"/>
               <a:t> </a:t>
             </a:r>
             <a:r>
-              <a:rPr lang="en-US" dirty="0" err="1"/>
+              <a:rPr lang="en-US" sz="2800" dirty="0" err="1"/>
               <a:t>sesgada</a:t>
             </a:r>
-            <a:endParaRPr lang="en-US" dirty="0"/>
+            <a:endParaRPr lang="en-US" sz="2800" dirty="0"/>
           </a:p>
         </p:txBody>
       </p:sp>
@@ -13388,6 +13409,10 @@
               <a:rPr lang="en-US" dirty="0" err="1"/>
               <a:t>probabilidad</a:t>
             </a:r>
+            <a:r>
+              <a:rPr lang="en-US" dirty="0"/>
+              <a:t/>
+            </a:r>
             <a:br>
               <a:rPr lang="en-US" dirty="0"/>
             </a:br>
@@ -14802,7 +14827,7 @@
         </p:nvSpPr>
         <p:spPr>
           <a:xfrm>
-            <a:off x="457200" y="1080247"/>
+            <a:off x="457200" y="874819"/>
             <a:ext cx="8229600" cy="4530725"/>
           </a:xfrm>
         </p:spPr>
@@ -14970,12 +14995,16 @@
           <a:p>
             <a:pPr lvl="1"/>
             <a:r>
-              <a:rPr lang="en-US" sz="2000" dirty="0"/>
-              <a:t>Data </a:t>
-            </a:r>
-            <a:r>
-              <a:rPr lang="en-US" sz="2000" dirty="0" err="1"/>
-              <a:t>desconocidos</a:t>
+              <a:rPr lang="en-US" sz="2000" dirty="0" err="1" smtClean="0"/>
+              <a:t>Datos</a:t>
+            </a:r>
+            <a:r>
+              <a:rPr lang="en-US" sz="2000" dirty="0" smtClean="0"/>
+              <a:t> </a:t>
+            </a:r>
+            <a:r>
+              <a:rPr lang="en-US" sz="2000" dirty="0" err="1" smtClean="0"/>
+              <a:t>conocidos</a:t>
             </a:r>
             <a:r>
               <a:rPr lang="en-US" sz="2000" dirty="0"/>
@@ -16330,7 +16359,7 @@
                 <a:pPr marL="0" indent="0">
                   <a:buNone/>
                 </a:pPr>
-                <a:endParaRPr lang="en-US" b="0" i="1" dirty="0">
+                <a:endParaRPr lang="en-US" b="0" i="1" dirty="0" smtClean="0">
                   <a:latin typeface="Cambria Math" panose="02040503050406030204" pitchFamily="18" charset="0"/>
                 </a:endParaRPr>
               </a:p>
@@ -16559,10 +16588,10 @@
                                             </m:sSubPr>
                                             <m:e>
                                               <m:r>
-                                                <a:rPr lang="en-US" i="1">
+                                                <a:rPr lang="en-US" b="0" i="1" smtClean="0">
                                                   <a:latin typeface="Cambria Math" panose="02040503050406030204" pitchFamily="18" charset="0"/>
                                                 </a:rPr>
-                                                <m:t>𝑦</m:t>
+                                                <m:t>𝑥</m:t>
                                               </m:r>
                                             </m:e>
                                             <m:sub>
@@ -17632,12 +17661,16 @@
               <a:t> la idea es la </a:t>
             </a:r>
             <a:r>
-              <a:rPr lang="en-US" dirty="0" err="1"/>
+              <a:rPr lang="en-US" dirty="0" err="1" smtClean="0"/>
               <a:t>misma</a:t>
             </a:r>
             <a:r>
-              <a:rPr lang="en-US" dirty="0"/>
-              <a:t>( (Poisson, binomial, etc.)</a:t>
+              <a:rPr lang="en-US" dirty="0" smtClean="0"/>
+              <a:t> (Poisson</a:t>
+            </a:r>
+            <a:r>
+              <a:rPr lang="en-US" dirty="0"/>
+              <a:t>, binomial, etc.)</a:t>
             </a:r>
           </a:p>
         </p:txBody>

</xml_diff>